<commit_message>
Edited the presentation and added the website url
Signed-off-by: raviv <ravivkomem@gmail.com>
</commit_message>
<xml_diff>
--- a/HW3/Car4U Presentation.pptx
+++ b/HW3/Car4U Presentation.pptx
@@ -15161,7 +15161,7 @@
           <a:p>
             <a:fld id="{F9747E11-E570-4708-81CF-EB1F05F8C434}" type="datetimeFigureOut">
               <a:rPr lang="he-IL" smtClean="0"/>
-              <a:t>כ"ט/סיון/תשפ"א</a:t>
+              <a:t>ג'/תמוז/תשפ"א</a:t>
             </a:fld>
             <a:endParaRPr lang="he-IL"/>
           </a:p>
@@ -15331,7 +15331,7 @@
           <a:p>
             <a:fld id="{F9747E11-E570-4708-81CF-EB1F05F8C434}" type="datetimeFigureOut">
               <a:rPr lang="he-IL" smtClean="0"/>
-              <a:t>כ"ט/סיון/תשפ"א</a:t>
+              <a:t>ג'/תמוז/תשפ"א</a:t>
             </a:fld>
             <a:endParaRPr lang="he-IL"/>
           </a:p>
@@ -15511,7 +15511,7 @@
           <a:p>
             <a:fld id="{F9747E11-E570-4708-81CF-EB1F05F8C434}" type="datetimeFigureOut">
               <a:rPr lang="he-IL" smtClean="0"/>
-              <a:t>כ"ט/סיון/תשפ"א</a:t>
+              <a:t>ג'/תמוז/תשפ"א</a:t>
             </a:fld>
             <a:endParaRPr lang="he-IL"/>
           </a:p>
@@ -15686,7 +15686,7 @@
           <a:p>
             <a:fld id="{F9747E11-E570-4708-81CF-EB1F05F8C434}" type="datetimeFigureOut">
               <a:rPr lang="he-IL" smtClean="0"/>
-              <a:t>כ"ט/סיון/תשפ"א</a:t>
+              <a:t>ג'/תמוז/תשפ"א</a:t>
             </a:fld>
             <a:endParaRPr lang="he-IL"/>
           </a:p>
@@ -15856,7 +15856,7 @@
           <a:p>
             <a:fld id="{F9747E11-E570-4708-81CF-EB1F05F8C434}" type="datetimeFigureOut">
               <a:rPr lang="he-IL" smtClean="0"/>
-              <a:t>כ"ט/סיון/תשפ"א</a:t>
+              <a:t>ג'/תמוז/תשפ"א</a:t>
             </a:fld>
             <a:endParaRPr lang="he-IL"/>
           </a:p>
@@ -16124,7 +16124,7 @@
           <a:p>
             <a:fld id="{F9747E11-E570-4708-81CF-EB1F05F8C434}" type="datetimeFigureOut">
               <a:rPr lang="he-IL" smtClean="0"/>
-              <a:t>כ"ט/סיון/תשפ"א</a:t>
+              <a:t>ג'/תמוז/תשפ"א</a:t>
             </a:fld>
             <a:endParaRPr lang="he-IL"/>
           </a:p>
@@ -16356,7 +16356,7 @@
           <a:p>
             <a:fld id="{F9747E11-E570-4708-81CF-EB1F05F8C434}" type="datetimeFigureOut">
               <a:rPr lang="he-IL" smtClean="0"/>
-              <a:t>כ"ט/סיון/תשפ"א</a:t>
+              <a:t>ג'/תמוז/תשפ"א</a:t>
             </a:fld>
             <a:endParaRPr lang="he-IL"/>
           </a:p>
@@ -16715,7 +16715,7 @@
           <a:p>
             <a:fld id="{F9747E11-E570-4708-81CF-EB1F05F8C434}" type="datetimeFigureOut">
               <a:rPr lang="he-IL" smtClean="0"/>
-              <a:t>כ"ט/סיון/תשפ"א</a:t>
+              <a:t>ג'/תמוז/תשפ"א</a:t>
             </a:fld>
             <a:endParaRPr lang="he-IL"/>
           </a:p>
@@ -16856,7 +16856,7 @@
           <a:p>
             <a:fld id="{F9747E11-E570-4708-81CF-EB1F05F8C434}" type="datetimeFigureOut">
               <a:rPr lang="he-IL" smtClean="0"/>
-              <a:t>כ"ט/סיון/תשפ"א</a:t>
+              <a:t>ג'/תמוז/תשפ"א</a:t>
             </a:fld>
             <a:endParaRPr lang="he-IL"/>
           </a:p>
@@ -16951,7 +16951,7 @@
           <a:p>
             <a:fld id="{F9747E11-E570-4708-81CF-EB1F05F8C434}" type="datetimeFigureOut">
               <a:rPr lang="he-IL" smtClean="0"/>
-              <a:t>כ"ט/סיון/תשפ"א</a:t>
+              <a:t>ג'/תמוז/תשפ"א</a:t>
             </a:fld>
             <a:endParaRPr lang="he-IL"/>
           </a:p>
@@ -17308,7 +17308,7 @@
           <a:p>
             <a:fld id="{F9747E11-E570-4708-81CF-EB1F05F8C434}" type="datetimeFigureOut">
               <a:rPr lang="he-IL" smtClean="0"/>
-              <a:t>כ"ט/סיון/תשפ"א</a:t>
+              <a:t>ג'/תמוז/תשפ"א</a:t>
             </a:fld>
             <a:endParaRPr lang="he-IL"/>
           </a:p>
@@ -17665,7 +17665,7 @@
           <a:p>
             <a:fld id="{F9747E11-E570-4708-81CF-EB1F05F8C434}" type="datetimeFigureOut">
               <a:rPr lang="he-IL" smtClean="0"/>
-              <a:t>כ"ט/סיון/תשפ"א</a:t>
+              <a:t>ג'/תמוז/תשפ"א</a:t>
             </a:fld>
             <a:endParaRPr lang="he-IL"/>
           </a:p>
@@ -17907,7 +17907,7 @@
           <a:p>
             <a:fld id="{F9747E11-E570-4708-81CF-EB1F05F8C434}" type="datetimeFigureOut">
               <a:rPr lang="he-IL" smtClean="0"/>
-              <a:t>כ"ט/סיון/תשפ"א</a:t>
+              <a:t>ג'/תמוז/תשפ"א</a:t>
             </a:fld>
             <a:endParaRPr lang="he-IL"/>
           </a:p>
@@ -21239,7 +21239,7 @@
               <a:buNone/>
             </a:pPr>
             <a:r>
-              <a:rPr lang="en-US" sz="1800" u="sng" dirty="0">
+              <a:rPr lang="en-US" sz="1800" u="sng">
                 <a:solidFill>
                   <a:srgbClr val="0563C1"/>
                 </a:solidFill>
@@ -21247,22 +21247,9 @@
                 <a:latin typeface="Arial" panose="020B0604020202020204" pitchFamily="34" charset="0"/>
                 <a:ea typeface="Calibri" panose="020F0502020204030204" pitchFamily="34" charset="0"/>
                 <a:cs typeface="Arial" panose="020B0604020202020204" pitchFamily="34" charset="0"/>
-                <a:hlinkClick r:id="rId3"/>
               </a:rPr>
-              <a:t>https://cloud-computing-cars.herokuapp.com</a:t>
+              <a:t>https://car4u-cloud-computing.herokuapp.com/</a:t>
             </a:r>
-            <a:endParaRPr lang="en-US" sz="1800" dirty="0">
-              <a:effectLst/>
-              <a:latin typeface="Calibri" panose="020F0502020204030204" pitchFamily="34" charset="0"/>
-              <a:ea typeface="Calibri" panose="020F0502020204030204" pitchFamily="34" charset="0"/>
-              <a:cs typeface="Arial" panose="020B0604020202020204" pitchFamily="34" charset="0"/>
-            </a:endParaRPr>
-          </a:p>
-          <a:p>
-            <a:pPr marL="0" indent="0">
-              <a:buFont typeface="Arial" panose="020B0604020202020204" pitchFamily="34" charset="0"/>
-              <a:buNone/>
-            </a:pPr>
             <a:endParaRPr lang="he-IL" dirty="0"/>
           </a:p>
         </p:txBody>

</xml_diff>